<commit_message>
add note about setting theta = False for laptop running
</commit_message>
<xml_diff>
--- a/Topics/1_migrating_your_DNN_to_candle/CANDLE_Compliant_DNN.pptx
+++ b/Topics/1_migrating_your_DNN_to_candle/CANDLE_Compliant_DNN.pptx
@@ -20373,7 +20373,29 @@
             </a:pPr>
             <a:r>
               <a:rPr lang="en-US" sz="1400" dirty="0" smtClean="0"/>
-              <a:t>*instructions for setting up dependencies:</a:t>
+              <a:t>* </a:t>
+            </a:r>
+            <a:r>
+              <a:rPr lang="en-US" sz="1400" smtClean="0"/>
+              <a:t>Set “theta = False”, </a:t>
+            </a:r>
+            <a:r>
+              <a:rPr lang="en-US" sz="1400" dirty="0" smtClean="0"/>
+              <a:t>otherwise the code looks for </a:t>
+            </a:r>
+            <a:r>
+              <a:rPr lang="en-US" sz="1400" smtClean="0"/>
+              <a:t>thread settings.</a:t>
+            </a:r>
+            <a:endParaRPr lang="en-US" sz="1400" dirty="0" smtClean="0"/>
+          </a:p>
+          <a:p>
+            <a:pPr marL="0" indent="0">
+              <a:buNone/>
+            </a:pPr>
+            <a:r>
+              <a:rPr lang="en-US" sz="1400" dirty="0" smtClean="0"/>
+              <a:t>**instructions for setting up dependencies:</a:t>
             </a:r>
           </a:p>
           <a:p>

</xml_diff>

<commit_message>
Fix slides and comments
</commit_message>
<xml_diff>
--- a/Topics/1_migrating_your_DNN_to_candle/CANDLE_Compliant_DNN.pptx
+++ b/Topics/1_migrating_your_DNN_to_candle/CANDLE_Compliant_DNN.pptx
@@ -1009,6 +1009,13 @@
         </dgm:presLayoutVars>
       </dgm:prSet>
       <dgm:spPr/>
+      <dgm:t>
+        <a:bodyPr/>
+        <a:lstStyle/>
+        <a:p>
+          <a:endParaRPr lang="en-US"/>
+        </a:p>
+      </dgm:t>
     </dgm:pt>
     <dgm:pt modelId="{C108BDA2-93A6-435C-BE21-C1125A99A0AC}" type="pres">
       <dgm:prSet presAssocID="{E5C8C33E-E4A1-4B4C-ABB7-4427334F9AE4}" presName="spVertical2" presStyleCnt="0"/>
@@ -1032,8 +1039,8 @@
     </dgm:pt>
   </dgm:ptLst>
   <dgm:cxnLst>
+    <dgm:cxn modelId="{339B6DAE-138B-4D75-9597-6ABA810135A7}" type="presOf" srcId="{386FC239-CD3F-4024-94C8-1A628F80D240}" destId="{EDCF0E69-4901-4030-ABB2-D5A60B8D55DC}" srcOrd="0" destOrd="0" presId="urn:microsoft.com/office/officeart/2005/8/layout/hProcess3"/>
     <dgm:cxn modelId="{60F82ED7-7DF9-4887-B014-EE06EFA89577}" type="presOf" srcId="{E5C8C33E-E4A1-4B4C-ABB7-4427334F9AE4}" destId="{FFCFA6B0-E810-4006-9DBF-51C2A59E7CD7}" srcOrd="0" destOrd="0" presId="urn:microsoft.com/office/officeart/2005/8/layout/hProcess3"/>
-    <dgm:cxn modelId="{339B6DAE-138B-4D75-9597-6ABA810135A7}" type="presOf" srcId="{386FC239-CD3F-4024-94C8-1A628F80D240}" destId="{EDCF0E69-4901-4030-ABB2-D5A60B8D55DC}" srcOrd="0" destOrd="0" presId="urn:microsoft.com/office/officeart/2005/8/layout/hProcess3"/>
     <dgm:cxn modelId="{94340461-0845-4A57-93FB-0B5BDCD73276}" srcId="{386FC239-CD3F-4024-94C8-1A628F80D240}" destId="{E5C8C33E-E4A1-4B4C-ABB7-4427334F9AE4}" srcOrd="0" destOrd="0" parTransId="{83BF0F7B-3724-4E9B-A014-7583F36E6D2A}" sibTransId="{6239EE81-AA04-4757-AB63-5E3104767A50}"/>
     <dgm:cxn modelId="{36088485-FD37-492E-BF48-4D2B32D98929}" type="presParOf" srcId="{EDCF0E69-4901-4030-ABB2-D5A60B8D55DC}" destId="{7DD4DA82-8CBE-4D2F-BC49-584BD0A7D021}" srcOrd="0" destOrd="0" presId="urn:microsoft.com/office/officeart/2005/8/layout/hProcess3"/>
     <dgm:cxn modelId="{60FDCD50-4806-4051-8840-A933F33B1FD6}" type="presParOf" srcId="{EDCF0E69-4901-4030-ABB2-D5A60B8D55DC}" destId="{FB9A2F4E-3028-47F4-B8F9-9BC2BE92A89E}" srcOrd="1" destOrd="0" presId="urn:microsoft.com/office/officeart/2005/8/layout/hProcess3"/>
@@ -2609,7 +2616,7 @@
           <a:p>
             <a:fld id="{8080A489-9093-C54A-B1C3-374F661A0010}" type="datetimeFigureOut">
               <a:rPr lang="en-US" smtClean="0"/>
-              <a:t>10/17/2018</a:t>
+              <a:t>10/18/2018</a:t>
             </a:fld>
             <a:endParaRPr lang="en-US"/>
           </a:p>
@@ -2926,7 +2933,7 @@
           <a:noFill/>
           <a:extLst>
             <a:ext uri="{909E8E84-426E-40dd-AFC4-6F175D3DCCD1}">
-              <a14:hiddenFill xmlns:a14="http://schemas.microsoft.com/office/drawing/2010/main" xmlns="">
+              <a14:hiddenFill xmlns="" xmlns:a14="http://schemas.microsoft.com/office/drawing/2010/main">
                 <a:solidFill>
                   <a:srgbClr val="FFFFFF"/>
                 </a:solidFill>
@@ -6034,7 +6041,7 @@
           <a:noFill/>
           <a:extLst>
             <a:ext uri="{909E8E84-426E-40dd-AFC4-6F175D3DCCD1}">
-              <a14:hiddenFill xmlns:a14="http://schemas.microsoft.com/office/drawing/2010/main" xmlns="">
+              <a14:hiddenFill xmlns="" xmlns:a14="http://schemas.microsoft.com/office/drawing/2010/main">
                 <a:solidFill>
                   <a:srgbClr val="FFFFFF"/>
                 </a:solidFill>
@@ -6578,7 +6585,7 @@
           <a:noFill/>
           <a:extLst>
             <a:ext uri="{909E8E84-426E-40dd-AFC4-6F175D3DCCD1}">
-              <a14:hiddenFill xmlns:a14="http://schemas.microsoft.com/office/drawing/2010/main" xmlns="">
+              <a14:hiddenFill xmlns="" xmlns:a14="http://schemas.microsoft.com/office/drawing/2010/main">
                 <a:solidFill>
                   <a:srgbClr val="FFFFFF"/>
                 </a:solidFill>
@@ -7516,7 +7523,7 @@
           <a:noFill/>
           <a:extLst>
             <a:ext uri="{909E8E84-426E-40dd-AFC4-6F175D3DCCD1}">
-              <a14:hiddenFill xmlns:a14="http://schemas.microsoft.com/office/drawing/2010/main" xmlns="">
+              <a14:hiddenFill xmlns="" xmlns:a14="http://schemas.microsoft.com/office/drawing/2010/main">
                 <a:solidFill>
                   <a:srgbClr val="FFFFFF"/>
                 </a:solidFill>
@@ -8292,7 +8299,7 @@
           <a:noFill/>
           <a:extLst>
             <a:ext uri="{909E8E84-426E-40dd-AFC4-6F175D3DCCD1}">
-              <a14:hiddenFill xmlns:a14="http://schemas.microsoft.com/office/drawing/2010/main" xmlns="">
+              <a14:hiddenFill xmlns="" xmlns:a14="http://schemas.microsoft.com/office/drawing/2010/main">
                 <a:solidFill>
                   <a:srgbClr val="FFFFFF"/>
                 </a:solidFill>
@@ -9105,7 +9112,7 @@
           <a:noFill/>
           <a:extLst>
             <a:ext uri="{909E8E84-426E-40dd-AFC4-6F175D3DCCD1}">
-              <a14:hiddenFill xmlns:a14="http://schemas.microsoft.com/office/drawing/2010/main" xmlns="">
+              <a14:hiddenFill xmlns="" xmlns:a14="http://schemas.microsoft.com/office/drawing/2010/main">
                 <a:solidFill>
                   <a:srgbClr val="FFFFFF"/>
                 </a:solidFill>
@@ -15228,7 +15235,7 @@
           <a:noFill/>
           <a:extLst>
             <a:ext uri="{909E8E84-426E-40dd-AFC4-6F175D3DCCD1}">
-              <a14:hiddenFill xmlns:a14="http://schemas.microsoft.com/office/drawing/2010/main" xmlns="">
+              <a14:hiddenFill xmlns="" xmlns:a14="http://schemas.microsoft.com/office/drawing/2010/main">
                 <a:solidFill>
                   <a:srgbClr val="FFFFFF"/>
                 </a:solidFill>
@@ -16750,25 +16757,6 @@
       </p:sp>
       <p:sp>
         <p:nvSpPr>
-          <p:cNvPr id="4" name="Text Placeholder 3"/>
-          <p:cNvSpPr>
-            <a:spLocks noGrp="1"/>
-          </p:cNvSpPr>
-          <p:nvPr>
-            <p:ph type="body" sz="quarter" idx="12"/>
-          </p:nvPr>
-        </p:nvSpPr>
-        <p:spPr/>
-        <p:txBody>
-          <a:bodyPr/>
-          <a:lstStyle/>
-          <a:p>
-            <a:endParaRPr lang="en-US" dirty="0"/>
-          </a:p>
-        </p:txBody>
-      </p:sp>
-      <p:sp>
-        <p:nvSpPr>
           <p:cNvPr id="5" name="Slide Number Placeholder 4"/>
           <p:cNvSpPr>
             <a:spLocks noGrp="1"/>
@@ -17056,7 +17044,27 @@
             </a:r>
             <a:r>
               <a:rPr lang="en-US" dirty="0" smtClean="0"/>
-              <a:t> object created in step 1.</a:t>
+              <a:t> object created in step 1. In our example there are two: </a:t>
+            </a:r>
+          </a:p>
+          <a:p>
+            <a:pPr marL="1193800" lvl="3" indent="-342900">
+              <a:buFont typeface="+mj-lt"/>
+              <a:buAutoNum type="arabicPeriod"/>
+            </a:pPr>
+            <a:r>
+              <a:rPr lang="en-US" dirty="0" smtClean="0"/>
+              <a:t>Connections</a:t>
+            </a:r>
+          </a:p>
+          <a:p>
+            <a:pPr marL="1193800" lvl="3" indent="-342900">
+              <a:buFont typeface="+mj-lt"/>
+              <a:buAutoNum type="arabicPeriod"/>
+            </a:pPr>
+            <a:r>
+              <a:rPr lang="en-US" dirty="0" smtClean="0"/>
+              <a:t>Distance</a:t>
             </a:r>
           </a:p>
           <a:p>
@@ -17201,7 +17209,6 @@
               <a:rPr lang="en-US" dirty="0"/>
               <a:t>? -2</a:t>
             </a:r>
-            <a:endParaRPr lang="en-US" dirty="0"/>
           </a:p>
         </p:txBody>
       </p:sp>
@@ -17261,8 +17268,8 @@
         </p:nvSpPr>
         <p:spPr>
           <a:xfrm>
-            <a:off x="609601" y="1560746"/>
-            <a:ext cx="8372901" cy="3317082"/>
+            <a:off x="257175" y="980089"/>
+            <a:ext cx="8886826" cy="3317082"/>
           </a:xfrm>
           <a:prstGeom prst="rect">
             <a:avLst/>
@@ -17489,21 +17496,91 @@
             <a:pPr lvl="1"/>
             <a:r>
               <a:rPr lang="en-US" dirty="0" smtClean="0"/>
-              <a:t>setup the network</a:t>
+              <a:t>setup the network (use values via </a:t>
+            </a:r>
+            <a:r>
+              <a:rPr lang="en-US" dirty="0" err="1" smtClean="0"/>
+              <a:t>gParameters</a:t>
+            </a:r>
+            <a:r>
+              <a:rPr lang="en-US" dirty="0" smtClean="0"/>
+              <a:t>)</a:t>
             </a:r>
           </a:p>
           <a:p>
             <a:pPr lvl="1"/>
             <a:r>
-              <a:rPr lang="en-US" dirty="0" smtClean="0"/>
-              <a:t>create loggers</a:t>
+              <a:rPr lang="en-US" dirty="0" err="1" smtClean="0"/>
+              <a:t>candle_keras.keras.default.config</a:t>
+            </a:r>
+            <a:r>
+              <a:rPr lang="en-US" dirty="0" smtClean="0"/>
+              <a:t> (returns a dictionary)</a:t>
             </a:r>
           </a:p>
           <a:p>
             <a:pPr lvl="1"/>
             <a:r>
-              <a:rPr lang="en-US" dirty="0" smtClean="0"/>
-              <a:t>Calls “</a:t>
+              <a:rPr lang="en-US" dirty="0" err="1" smtClean="0"/>
+              <a:t>candle_keras.build_optimizer</a:t>
+            </a:r>
+            <a:r>
+              <a:rPr lang="en-US" dirty="0" smtClean="0"/>
+              <a:t> (returns a </a:t>
+            </a:r>
+            <a:r>
+              <a:rPr lang="en-US" dirty="0" err="1" smtClean="0"/>
+              <a:t>keras</a:t>
+            </a:r>
+            <a:r>
+              <a:rPr lang="en-US" dirty="0" smtClean="0"/>
+              <a:t> optimizer function) </a:t>
+            </a:r>
+            <a:r>
+              <a:rPr lang="en-US" sz="1200" dirty="0"/>
+              <a:t>See this </a:t>
+            </a:r>
+            <a:r>
+              <a:rPr lang="en-US" sz="1200" dirty="0">
+                <a:hlinkClick r:id="rId2"/>
+              </a:rPr>
+              <a:t>https://</a:t>
+            </a:r>
+            <a:r>
+              <a:rPr lang="en-US" sz="1200" dirty="0" smtClean="0">
+                <a:hlinkClick r:id="rId2"/>
+              </a:rPr>
+              <a:t>ecp-candle.github.io/Candle/html/candle_lib/keras_utils.html#keras_utils.build_optimizer</a:t>
+            </a:r>
+            <a:r>
+              <a:rPr lang="en-US" sz="1200" dirty="0" smtClean="0"/>
+              <a:t> Exposes </a:t>
+            </a:r>
+            <a:r>
+              <a:rPr lang="en-US" sz="1200" dirty="0" err="1" smtClean="0"/>
+              <a:t>keras</a:t>
+            </a:r>
+            <a:r>
+              <a:rPr lang="en-US" sz="1200" dirty="0" smtClean="0"/>
+              <a:t> parameters nicely.</a:t>
+            </a:r>
+          </a:p>
+          <a:p>
+            <a:pPr lvl="1"/>
+            <a:r>
+              <a:rPr lang="en-US" dirty="0"/>
+              <a:t>Model instantiate (set input and </a:t>
+            </a:r>
+            <a:r>
+              <a:rPr lang="en-US" dirty="0" smtClean="0"/>
+              <a:t>output), Create loggers</a:t>
+            </a:r>
+          </a:p>
+          <a:p>
+            <a:pPr lvl="1"/>
+            <a:r>
+              <a:rPr lang="en-US" dirty="0" smtClean="0"/>
+              <a:t>Calls to “</a:t>
             </a:r>
             <a:r>
               <a:rPr lang="en-US" dirty="0" err="1" smtClean="0"/>
@@ -17511,7 +17588,15 @@
             </a:r>
             <a:r>
               <a:rPr lang="en-US" dirty="0" smtClean="0"/>
-              <a:t>” </a:t>
+              <a:t>” and finally “</a:t>
+            </a:r>
+            <a:r>
+              <a:rPr lang="en-US" dirty="0" err="1" smtClean="0"/>
+              <a:t>model.evaluate</a:t>
+            </a:r>
+            <a:r>
+              <a:rPr lang="en-US" dirty="0" smtClean="0"/>
+              <a:t>”</a:t>
             </a:r>
           </a:p>
           <a:p>
@@ -17528,14 +17613,14 @@
           <p:nvPr/>
         </p:nvPicPr>
         <p:blipFill>
-          <a:blip r:embed="rId2"/>
+          <a:blip r:embed="rId3"/>
           <a:stretch>
             <a:fillRect/>
           </a:stretch>
         </p:blipFill>
         <p:spPr>
           <a:xfrm>
-            <a:off x="778669" y="1560746"/>
+            <a:off x="1185434" y="1012355"/>
             <a:ext cx="4743450" cy="952500"/>
           </a:xfrm>
           <a:prstGeom prst="rect">
@@ -17551,7 +17636,7 @@
         </p:nvSpPr>
         <p:spPr>
           <a:xfrm>
-            <a:off x="5691187" y="1852330"/>
+            <a:off x="5984081" y="1278492"/>
             <a:ext cx="1628774" cy="369332"/>
           </a:xfrm>
           <a:prstGeom prst="rect">
@@ -17639,11 +17724,7 @@
           <a:p>
             <a:r>
               <a:rPr lang="en-US" dirty="0" smtClean="0"/>
-              <a:t>DEMO: Running </a:t>
-            </a:r>
-            <a:r>
-              <a:rPr lang="en-US" dirty="0" smtClean="0"/>
-              <a:t>t29 on theta</a:t>
+              <a:t>DEMO: Running t29 on theta</a:t>
             </a:r>
             <a:endParaRPr lang="en-US" dirty="0"/>
           </a:p>
@@ -18634,7 +18715,11 @@
           <a:p>
             <a:r>
               <a:rPr lang="en-US" dirty="0" smtClean="0"/>
-              <a:t>P1B3 example</a:t>
+              <a:t>An example: P1B3 </a:t>
+            </a:r>
+            <a:r>
+              <a:rPr lang="en-US" dirty="0" smtClean="0"/>
+              <a:t>Benchmark</a:t>
             </a:r>
           </a:p>
           <a:p>
@@ -18646,8 +18731,13 @@
           <a:p>
             <a:r>
               <a:rPr lang="en-US" dirty="0"/>
-              <a:t>Testing Benchmarks and Frameworks</a:t>
-            </a:r>
+              <a:t>Testing Benchmarks and </a:t>
+            </a:r>
+            <a:r>
+              <a:rPr lang="en-US" dirty="0" smtClean="0"/>
+              <a:t>Supervisor</a:t>
+            </a:r>
+            <a:endParaRPr lang="en-US" dirty="0"/>
           </a:p>
           <a:p>
             <a:r>
@@ -18683,7 +18773,23 @@
             <a:pPr lvl="1"/>
             <a:r>
               <a:rPr lang="en-US" dirty="0" smtClean="0"/>
-              <a:t>Actual t29res and migrated - cc_t29res.py</a:t>
+              <a:t>“original”</a:t>
+            </a:r>
+            <a:r>
+              <a:rPr lang="en-US" dirty="0" smtClean="0"/>
+              <a:t> </a:t>
+            </a:r>
+            <a:r>
+              <a:rPr lang="en-US" dirty="0" smtClean="0"/>
+              <a:t>t29res and </a:t>
+            </a:r>
+            <a:r>
+              <a:rPr lang="en-US" dirty="0" smtClean="0"/>
+              <a:t>“migrated” </a:t>
+            </a:r>
+            <a:r>
+              <a:rPr lang="en-US" dirty="0" smtClean="0"/>
+              <a:t>- cc_t29res.py</a:t>
             </a:r>
           </a:p>
           <a:p>
@@ -19061,7 +19167,6 @@
               <a:rPr lang="en-US" sz="1400" dirty="0"/>
               <a:t>) b tumor sites, (ii) t tumor laterality, and (iii) g clinical grade of tumors.</a:t>
             </a:r>
-            <a:endParaRPr lang="en-US" sz="1400" dirty="0"/>
           </a:p>
           <a:p>
             <a:r>
@@ -19075,7 +19180,6 @@
               <a:rPr lang="en-US" sz="1400" dirty="0"/>
               <a:t>Relationship to core problem: Instead of training individual deep learning networks for individual machine learning tasks, Build a multi-task DNN that can exploit task-relatedness to simultaneously learn multiple concepts.</a:t>
             </a:r>
-            <a:endParaRPr lang="en-US" sz="1400" dirty="0"/>
           </a:p>
           <a:p>
             <a:r>
@@ -19089,7 +19193,6 @@
               <a:rPr lang="en-US" sz="1400" dirty="0"/>
               <a:t>Expected outcome: Multi-task DNN that trains on same corpus and can automatically classify across three related tasks.</a:t>
             </a:r>
-            <a:endParaRPr lang="en-US" sz="1400" dirty="0"/>
           </a:p>
           <a:p>
             <a:pPr marL="0" indent="0">
@@ -19284,7 +19387,6 @@
               <a:rPr lang="en-US" dirty="0"/>
               <a:t>Benefits of migrating to CANDLE:</a:t>
             </a:r>
-            <a:endParaRPr lang="en-US" dirty="0"/>
           </a:p>
         </p:txBody>
       </p:sp>
@@ -19537,7 +19639,6 @@
               <a:rPr lang="en-US" dirty="0"/>
               <a:t>Benefits of migrating to CANDLE:</a:t>
             </a:r>
-            <a:endParaRPr lang="en-US" dirty="0"/>
           </a:p>
         </p:txBody>
       </p:sp>
@@ -19564,7 +19665,15 @@
             <a:pPr fontAlgn="base"/>
             <a:r>
               <a:rPr lang="en-US" dirty="0"/>
-              <a:t>Provides various utility packages that promote reuse and no hardcoded values</a:t>
+              <a:t>Provides </a:t>
+            </a:r>
+            <a:r>
+              <a:rPr lang="en-US" dirty="0" smtClean="0"/>
+              <a:t>various actively developed </a:t>
+            </a:r>
+            <a:r>
+              <a:rPr lang="en-US" dirty="0"/>
+              <a:t>utility packages that promote reuse and no hardcoded values</a:t>
             </a:r>
           </a:p>
           <a:p>
@@ -19591,9 +19700,37 @@
           <a:p>
             <a:pPr lvl="1" fontAlgn="base"/>
             <a:r>
+              <a:rPr lang="en-US" dirty="0" smtClean="0"/>
+              <a:t>Keras_utils.py</a:t>
+            </a:r>
+          </a:p>
+          <a:p>
+            <a:pPr lvl="1" fontAlgn="base"/>
+            <a:r>
+              <a:rPr lang="en-US" dirty="0" smtClean="0"/>
+              <a:t>and </a:t>
+            </a:r>
+            <a:r>
               <a:rPr lang="en-US" dirty="0"/>
-              <a:t>Keras_utils.py</a:t>
-            </a:r>
+              <a:t>more </a:t>
+            </a:r>
+            <a:r>
+              <a:rPr lang="en-US" dirty="0">
+                <a:hlinkClick r:id="rId2"/>
+              </a:rPr>
+              <a:t>https://</a:t>
+            </a:r>
+            <a:r>
+              <a:rPr lang="en-US" dirty="0" smtClean="0">
+                <a:hlinkClick r:id="rId2"/>
+              </a:rPr>
+              <a:t>ecp-candle.github.io/Candle/html/candle_lib</a:t>
+            </a:r>
+            <a:r>
+              <a:rPr lang="en-US" dirty="0" smtClean="0"/>
+              <a:t> </a:t>
+            </a:r>
+            <a:endParaRPr lang="en-US" dirty="0"/>
           </a:p>
           <a:p>
             <a:pPr fontAlgn="base"/>
@@ -19626,11 +19763,7 @@
             <a:pPr fontAlgn="base"/>
             <a:r>
               <a:rPr lang="en-US" dirty="0"/>
-              <a:t>Pre-existing for containers such as Singularity (Ex. machines such as </a:t>
-            </a:r>
-            <a:r>
-              <a:rPr lang="en-US" dirty="0"/>
-              <a:t>T</a:t>
+              <a:t>Pre-existing for containers such as Singularity (Ex. machines such as T</a:t>
             </a:r>
             <a:r>
               <a:rPr lang="en-US" dirty="0" smtClean="0"/>
@@ -20055,11 +20188,7 @@
           <a:p>
             <a:r>
               <a:rPr lang="en-US" dirty="0" smtClean="0"/>
-              <a:t>About </a:t>
-            </a:r>
-            <a:r>
-              <a:rPr lang="en-US" dirty="0" smtClean="0"/>
-              <a:t>t29RES</a:t>
+              <a:t>About t29RES</a:t>
             </a:r>
             <a:endParaRPr lang="en-US" dirty="0"/>
           </a:p>
@@ -20125,7 +20254,7 @@
             </a:pPr>
             <a:r>
               <a:rPr lang="en-US" dirty="0" smtClean="0"/>
-              <a:t>Train: (3572, 6213)</a:t>
+              <a:t>Test file: (3572, 6213)   ~ 22M numbers!</a:t>
             </a:r>
           </a:p>
           <a:p>
@@ -20134,7 +20263,7 @@
             </a:pPr>
             <a:r>
               <a:rPr lang="en-US" dirty="0" smtClean="0"/>
-              <a:t>Test file: (14288, 6213)</a:t>
+              <a:t>Train file: (14288, 6213) ~ 89M numbers!</a:t>
             </a:r>
           </a:p>
           <a:p>
@@ -20373,21 +20502,8 @@
             </a:pPr>
             <a:r>
               <a:rPr lang="en-US" sz="1400" dirty="0" smtClean="0"/>
-              <a:t>* </a:t>
-            </a:r>
-            <a:r>
-              <a:rPr lang="en-US" sz="1400" smtClean="0"/>
-              <a:t>Set “theta = False”, </a:t>
-            </a:r>
-            <a:r>
-              <a:rPr lang="en-US" sz="1400" dirty="0" smtClean="0"/>
-              <a:t>otherwise the code looks for </a:t>
-            </a:r>
-            <a:r>
-              <a:rPr lang="en-US" sz="1400" smtClean="0"/>
-              <a:t>thread settings.</a:t>
-            </a:r>
-            <a:endParaRPr lang="en-US" sz="1400" dirty="0" smtClean="0"/>
+              <a:t>* Set “theta = False”, otherwise the code looks for thread settings.</a:t>
+            </a:r>
           </a:p>
           <a:p>
             <a:pPr marL="0" indent="0">

</xml_diff>